<commit_message>
Ajout de la classe CSVreader pour detection auto des colonnes. Detection du champ AZM
</commit_message>
<xml_diff>
--- a/TUTO_EventCartoViewer.pptx
+++ b/TUTO_EventCartoViewer.pptx
@@ -5,11 +5,13 @@
     <p:sldMasterId id="2147483660" r:id="rId1"/>
   </p:sldMasterIdLst>
   <p:notesMasterIdLst>
-    <p:notesMasterId r:id="rId4"/>
+    <p:notesMasterId r:id="rId6"/>
   </p:notesMasterIdLst>
   <p:sldIdLst>
     <p:sldId id="258" r:id="rId2"/>
     <p:sldId id="306" r:id="rId3"/>
+    <p:sldId id="308" r:id="rId4"/>
+    <p:sldId id="307" r:id="rId5"/>
   </p:sldIdLst>
   <p:sldSz cx="9144000" cy="6858000" type="screen4x3"/>
   <p:notesSz cx="6858000" cy="9144000"/>
@@ -210,7 +212,7 @@
             <a:fld id="{BDF2A71B-5DC1-4CC3-81B5-30C08E317B94}" type="datetimeFigureOut">
               <a:rPr lang="fr-FR" smtClean="0"/>
               <a:pPr/>
-              <a:t>04/04/2022</a:t>
+              <a:t>17/05/2022</a:t>
             </a:fld>
             <a:endParaRPr lang="fr-FR"/>
           </a:p>
@@ -688,7 +690,7 @@
             <a:fld id="{2AD8A078-8F0D-4B44-934F-D3DB161891DE}" type="datetimeFigureOut">
               <a:rPr lang="fr-FR" smtClean="0"/>
               <a:pPr/>
-              <a:t>04/04/2022</a:t>
+              <a:t>17/05/2022</a:t>
             </a:fld>
             <a:endParaRPr lang="fr-FR"/>
           </a:p>
@@ -903,7 +905,7 @@
             <a:fld id="{2AD8A078-8F0D-4B44-934F-D3DB161891DE}" type="datetimeFigureOut">
               <a:rPr lang="fr-FR" smtClean="0"/>
               <a:pPr/>
-              <a:t>04/04/2022</a:t>
+              <a:t>17/05/2022</a:t>
             </a:fld>
             <a:endParaRPr lang="fr-FR"/>
           </a:p>
@@ -1474,54 +1476,158 @@
           </a:p>
         </p:txBody>
       </p:sp>
-      <p:pic>
-        <p:nvPicPr>
-          <p:cNvPr id="2" name="Image 1"/>
-          <p:cNvPicPr>
-            <a:picLocks noChangeAspect="1"/>
-          </p:cNvPicPr>
+      <p:sp>
+        <p:nvSpPr>
+          <p:cNvPr id="5" name="ZoneTexte 4"/>
+          <p:cNvSpPr txBox="1"/>
           <p:nvPr/>
-        </p:nvPicPr>
-        <p:blipFill>
-          <a:blip r:embed="rId3"/>
-          <a:stretch>
-            <a:fillRect/>
-          </a:stretch>
-        </p:blipFill>
+        </p:nvSpPr>
         <p:spPr>
           <a:xfrm>
-            <a:off x="2619375" y="2495550"/>
-            <a:ext cx="3905250" cy="1866900"/>
+            <a:off x="465826" y="2035834"/>
+            <a:ext cx="7326236" cy="3416320"/>
           </a:xfrm>
           <a:prstGeom prst="rect">
             <a:avLst/>
           </a:prstGeom>
+          <a:noFill/>
         </p:spPr>
-      </p:pic>
-      <p:pic>
-        <p:nvPicPr>
-          <p:cNvPr id="3" name="Image 2"/>
-          <p:cNvPicPr>
-            <a:picLocks noChangeAspect="1"/>
-          </p:cNvPicPr>
-          <p:nvPr/>
-        </p:nvPicPr>
-        <p:blipFill>
-          <a:blip r:embed="rId4"/>
-          <a:stretch>
-            <a:fillRect/>
-          </a:stretch>
-        </p:blipFill>
-        <p:spPr>
-          <a:xfrm>
-            <a:off x="-20960" y="5162570"/>
-            <a:ext cx="9144000" cy="1025658"/>
-          </a:xfrm>
-          <a:prstGeom prst="rect">
-            <a:avLst/>
-          </a:prstGeom>
-        </p:spPr>
-      </p:pic>
+        <p:txBody>
+          <a:bodyPr wrap="none" rtlCol="0">
+            <a:spAutoFit/>
+          </a:bodyPr>
+          <a:lstStyle/>
+          <a:p>
+            <a:r>
+              <a:rPr lang="fr-FR" dirty="0" err="1" smtClean="0"/>
+              <a:t>EventCartoViewer</a:t>
+            </a:r>
+            <a:r>
+              <a:rPr lang="fr-FR" dirty="0" smtClean="0"/>
+              <a:t> supporte deux types de fichiers :</a:t>
+            </a:r>
+          </a:p>
+          <a:p>
+            <a:pPr marL="285750" indent="-285750">
+              <a:buFontTx/>
+              <a:buChar char="-"/>
+            </a:pPr>
+            <a:r>
+              <a:rPr lang="fr-FR" dirty="0" smtClean="0"/>
+              <a:t>WKT</a:t>
+            </a:r>
+          </a:p>
+          <a:p>
+            <a:pPr marL="742950" lvl="1" indent="-285750">
+              <a:buFontTx/>
+              <a:buChar char="-"/>
+            </a:pPr>
+            <a:r>
+              <a:rPr lang="fr-FR" dirty="0" smtClean="0"/>
+              <a:t>export (par ex via </a:t>
+            </a:r>
+            <a:r>
+              <a:rPr lang="fr-FR" dirty="0" err="1" smtClean="0"/>
+              <a:t>globalmapper</a:t>
+            </a:r>
+            <a:r>
+              <a:rPr lang="fr-FR" dirty="0" smtClean="0"/>
+              <a:t>) de vecteurs (points lignes surfaces)</a:t>
+            </a:r>
+          </a:p>
+          <a:p>
+            <a:pPr marL="742950" lvl="1" indent="-285750">
+              <a:buFontTx/>
+              <a:buChar char="-"/>
+            </a:pPr>
+            <a:r>
+              <a:rPr lang="fr-FR" dirty="0" smtClean="0"/>
+              <a:t>Doit comporter les champs</a:t>
+            </a:r>
+          </a:p>
+          <a:p>
+            <a:pPr marL="1200150" lvl="2" indent="-285750">
+              <a:buFontTx/>
+              <a:buChar char="-"/>
+            </a:pPr>
+            <a:r>
+              <a:rPr lang="fr-FR" dirty="0" smtClean="0"/>
+              <a:t>GDH DEBUT</a:t>
+            </a:r>
+          </a:p>
+          <a:p>
+            <a:pPr marL="1200150" lvl="2" indent="-285750">
+              <a:buFontTx/>
+              <a:buChar char="-"/>
+            </a:pPr>
+            <a:r>
+              <a:rPr lang="fr-FR" dirty="0" smtClean="0"/>
+              <a:t>GDH FIN</a:t>
+            </a:r>
+          </a:p>
+          <a:p>
+            <a:pPr marL="1200150" lvl="2" indent="-285750">
+              <a:buFontTx/>
+              <a:buChar char="-"/>
+            </a:pPr>
+            <a:r>
+              <a:rPr lang="fr-FR" dirty="0" smtClean="0"/>
+              <a:t>LABEL</a:t>
+            </a:r>
+          </a:p>
+          <a:p>
+            <a:pPr marL="1200150" lvl="2" indent="-285750">
+              <a:buFontTx/>
+              <a:buChar char="-"/>
+            </a:pPr>
+            <a:r>
+              <a:rPr lang="fr-FR" dirty="0" smtClean="0"/>
+              <a:t>DESCRIPTION</a:t>
+            </a:r>
+          </a:p>
+          <a:p>
+            <a:pPr marL="1200150" lvl="2" indent="-285750">
+              <a:buFontTx/>
+              <a:buChar char="-"/>
+            </a:pPr>
+            <a:r>
+              <a:rPr lang="fr-FR" dirty="0" smtClean="0"/>
+              <a:t>STYLE</a:t>
+            </a:r>
+          </a:p>
+          <a:p>
+            <a:pPr marL="285750" indent="-285750">
+              <a:buFontTx/>
+              <a:buChar char="-"/>
+            </a:pPr>
+            <a:r>
+              <a:rPr lang="fr-FR" dirty="0" smtClean="0"/>
+              <a:t>CSV</a:t>
+            </a:r>
+          </a:p>
+          <a:p>
+            <a:pPr marL="742950" lvl="1" indent="-285750">
+              <a:buFontTx/>
+              <a:buChar char="-"/>
+            </a:pPr>
+            <a:r>
+              <a:rPr lang="fr-FR" dirty="0" smtClean="0"/>
+              <a:t>Liste de points</a:t>
+            </a:r>
+          </a:p>
+          <a:p>
+            <a:pPr marL="742950" lvl="1" indent="-285750">
+              <a:buFontTx/>
+              <a:buChar char="-"/>
+            </a:pPr>
+            <a:r>
+              <a:rPr lang="fr-FR" dirty="0" smtClean="0"/>
+              <a:t>Détection des champs</a:t>
+            </a:r>
+            <a:endParaRPr lang="fr-FR" dirty="0"/>
+          </a:p>
+        </p:txBody>
+      </p:sp>
     </p:spTree>
     <p:extLst>
       <p:ext uri="{BB962C8B-B14F-4D97-AF65-F5344CB8AC3E}">
@@ -1539,6 +1645,274 @@
       </p:par>
     </p:tnLst>
   </p:timing>
+</p:sld>
+</file>
+
+<file path=ppt/slides/slide3.xml><?xml version="1.0" encoding="utf-8"?>
+<p:sld xmlns:a="http://schemas.openxmlformats.org/drawingml/2006/main" xmlns:r="http://schemas.openxmlformats.org/officeDocument/2006/relationships" xmlns:p="http://schemas.openxmlformats.org/presentationml/2006/main">
+  <p:cSld>
+    <p:spTree>
+      <p:nvGrpSpPr>
+        <p:cNvPr id="1" name=""/>
+        <p:cNvGrpSpPr/>
+        <p:nvPr/>
+      </p:nvGrpSpPr>
+      <p:grpSpPr>
+        <a:xfrm>
+          <a:off x="0" y="0"/>
+          <a:ext cx="0" cy="0"/>
+          <a:chOff x="0" y="0"/>
+          <a:chExt cx="0" cy="0"/>
+        </a:xfrm>
+      </p:grpSpPr>
+      <p:sp>
+        <p:nvSpPr>
+          <p:cNvPr id="2" name="ZoneTexte 1"/>
+          <p:cNvSpPr txBox="1"/>
+          <p:nvPr/>
+        </p:nvSpPr>
+        <p:spPr>
+          <a:xfrm>
+            <a:off x="703658" y="1639019"/>
+            <a:ext cx="7694763" cy="4247317"/>
+          </a:xfrm>
+          <a:prstGeom prst="rect">
+            <a:avLst/>
+          </a:prstGeom>
+          <a:noFill/>
+        </p:spPr>
+        <p:txBody>
+          <a:bodyPr wrap="square" rtlCol="0">
+            <a:spAutoFit/>
+          </a:bodyPr>
+          <a:lstStyle/>
+          <a:p>
+            <a:r>
+              <a:rPr lang="fr-FR" dirty="0" smtClean="0"/>
+              <a:t>Champs reconnus :</a:t>
+            </a:r>
+          </a:p>
+          <a:p>
+            <a:pPr marL="285750" indent="-285750">
+              <a:buFontTx/>
+              <a:buChar char="-"/>
+            </a:pPr>
+            <a:r>
+              <a:rPr lang="fr-FR" dirty="0" smtClean="0"/>
+              <a:t>X / LONG / LONGITUDE</a:t>
+            </a:r>
+          </a:p>
+          <a:p>
+            <a:pPr marL="285750" indent="-285750">
+              <a:buFontTx/>
+              <a:buChar char="-"/>
+            </a:pPr>
+            <a:r>
+              <a:rPr lang="fr-FR" dirty="0" smtClean="0"/>
+              <a:t>Y / LAT / LATITUDE</a:t>
+            </a:r>
+          </a:p>
+          <a:p>
+            <a:pPr marL="285750" indent="-285750">
+              <a:buFontTx/>
+              <a:buChar char="-"/>
+            </a:pPr>
+            <a:r>
+              <a:rPr lang="fr-FR" dirty="0" smtClean="0"/>
+              <a:t>GDH DEBUT / GDH</a:t>
+            </a:r>
+          </a:p>
+          <a:p>
+            <a:pPr marL="285750" indent="-285750">
+              <a:buFontTx/>
+              <a:buChar char="-"/>
+            </a:pPr>
+            <a:r>
+              <a:rPr lang="fr-FR" dirty="0" smtClean="0"/>
+              <a:t>GDH FIN / GDH</a:t>
+            </a:r>
+          </a:p>
+          <a:p>
+            <a:pPr marL="285750" indent="-285750">
+              <a:buFontTx/>
+              <a:buChar char="-"/>
+            </a:pPr>
+            <a:r>
+              <a:rPr lang="fr-FR" dirty="0" smtClean="0"/>
+              <a:t>LABEL</a:t>
+            </a:r>
+          </a:p>
+          <a:p>
+            <a:pPr marL="285750" indent="-285750">
+              <a:buFontTx/>
+              <a:buChar char="-"/>
+            </a:pPr>
+            <a:r>
+              <a:rPr lang="fr-FR" dirty="0" smtClean="0"/>
+              <a:t>DESCRIPTION</a:t>
+            </a:r>
+          </a:p>
+          <a:p>
+            <a:pPr marL="285750" indent="-285750">
+              <a:buFontTx/>
+              <a:buChar char="-"/>
+            </a:pPr>
+            <a:r>
+              <a:rPr lang="fr-FR" dirty="0" smtClean="0"/>
+              <a:t>STYLE</a:t>
+            </a:r>
+          </a:p>
+          <a:p>
+            <a:endParaRPr lang="fr-FR" dirty="0"/>
+          </a:p>
+          <a:p>
+            <a:r>
+              <a:rPr lang="fr-FR" dirty="0" smtClean="0"/>
+              <a:t>Champs obligatoires :</a:t>
+            </a:r>
+          </a:p>
+          <a:p>
+            <a:pPr marL="285750" indent="-285750">
+              <a:buFontTx/>
+              <a:buChar char="-"/>
+            </a:pPr>
+            <a:r>
+              <a:rPr lang="fr-FR" dirty="0" smtClean="0"/>
+              <a:t>X</a:t>
+            </a:r>
+          </a:p>
+          <a:p>
+            <a:pPr marL="285750" indent="-285750">
+              <a:buFontTx/>
+              <a:buChar char="-"/>
+            </a:pPr>
+            <a:r>
+              <a:rPr lang="fr-FR" dirty="0" smtClean="0"/>
+              <a:t>Y</a:t>
+            </a:r>
+          </a:p>
+          <a:p>
+            <a:pPr marL="285750" indent="-285750">
+              <a:buFontTx/>
+              <a:buChar char="-"/>
+            </a:pPr>
+            <a:r>
+              <a:rPr lang="fr-FR" dirty="0" smtClean="0"/>
+              <a:t>GDH</a:t>
+            </a:r>
+            <a:endParaRPr lang="fr-FR" dirty="0" smtClean="0"/>
+          </a:p>
+          <a:p>
+            <a:endParaRPr lang="fr-FR" dirty="0" smtClean="0"/>
+          </a:p>
+          <a:p>
+            <a:r>
+              <a:rPr lang="fr-FR" dirty="0" smtClean="0"/>
+              <a:t>Les champs supplémentaires sont pris </a:t>
+            </a:r>
+            <a:r>
+              <a:rPr lang="fr-FR" smtClean="0"/>
+              <a:t>en compte.</a:t>
+            </a:r>
+            <a:endParaRPr lang="fr-FR" dirty="0"/>
+          </a:p>
+        </p:txBody>
+      </p:sp>
+      <p:sp>
+        <p:nvSpPr>
+          <p:cNvPr id="3" name="ZoneTexte 2"/>
+          <p:cNvSpPr txBox="1"/>
+          <p:nvPr/>
+        </p:nvSpPr>
+        <p:spPr>
+          <a:xfrm>
+            <a:off x="-20960" y="548680"/>
+            <a:ext cx="9144000" cy="584775"/>
+          </a:xfrm>
+          <a:prstGeom prst="rect">
+            <a:avLst/>
+          </a:prstGeom>
+          <a:noFill/>
+        </p:spPr>
+        <p:txBody>
+          <a:bodyPr wrap="square" rtlCol="0">
+            <a:spAutoFit/>
+          </a:bodyPr>
+          <a:lstStyle/>
+          <a:p>
+            <a:pPr algn="ctr"/>
+            <a:r>
+              <a:rPr lang="fr-FR" sz="3200" b="1" dirty="0" smtClean="0"/>
+              <a:t>Formats de fichiers</a:t>
+            </a:r>
+            <a:endParaRPr lang="fr-FR" sz="1600" b="1" dirty="0" smtClean="0"/>
+          </a:p>
+        </p:txBody>
+      </p:sp>
+    </p:spTree>
+    <p:extLst>
+      <p:ext uri="{BB962C8B-B14F-4D97-AF65-F5344CB8AC3E}">
+        <p14:creationId xmlns:p14="http://schemas.microsoft.com/office/powerpoint/2010/main" val="2011051579"/>
+      </p:ext>
+    </p:extLst>
+  </p:cSld>
+  <p:clrMapOvr>
+    <a:masterClrMapping/>
+  </p:clrMapOvr>
+</p:sld>
+</file>
+
+<file path=ppt/slides/slide4.xml><?xml version="1.0" encoding="utf-8"?>
+<p:sld xmlns:a="http://schemas.openxmlformats.org/drawingml/2006/main" xmlns:r="http://schemas.openxmlformats.org/officeDocument/2006/relationships" xmlns:p="http://schemas.openxmlformats.org/presentationml/2006/main">
+  <p:cSld>
+    <p:spTree>
+      <p:nvGrpSpPr>
+        <p:cNvPr id="1" name=""/>
+        <p:cNvGrpSpPr/>
+        <p:nvPr/>
+      </p:nvGrpSpPr>
+      <p:grpSpPr>
+        <a:xfrm>
+          <a:off x="0" y="0"/>
+          <a:ext cx="0" cy="0"/>
+          <a:chOff x="0" y="0"/>
+          <a:chExt cx="0" cy="0"/>
+        </a:xfrm>
+      </p:grpSpPr>
+      <p:pic>
+        <p:nvPicPr>
+          <p:cNvPr id="2" name="Image 1"/>
+          <p:cNvPicPr>
+            <a:picLocks noChangeAspect="1"/>
+          </p:cNvPicPr>
+          <p:nvPr/>
+        </p:nvPicPr>
+        <p:blipFill>
+          <a:blip r:embed="rId2"/>
+          <a:stretch>
+            <a:fillRect/>
+          </a:stretch>
+        </p:blipFill>
+        <p:spPr>
+          <a:xfrm>
+            <a:off x="0" y="877824"/>
+            <a:ext cx="9144000" cy="5980176"/>
+          </a:xfrm>
+          <a:prstGeom prst="rect">
+            <a:avLst/>
+          </a:prstGeom>
+        </p:spPr>
+      </p:pic>
+    </p:spTree>
+    <p:extLst>
+      <p:ext uri="{BB962C8B-B14F-4D97-AF65-F5344CB8AC3E}">
+        <p14:creationId xmlns:p14="http://schemas.microsoft.com/office/powerpoint/2010/main" val="3939927945"/>
+      </p:ext>
+    </p:extLst>
+  </p:cSld>
+  <p:clrMapOvr>
+    <a:masterClrMapping/>
+  </p:clrMapOvr>
 </p:sld>
 </file>
 

</xml_diff>

<commit_message>
0.0.5 Affiche plus de détail (début/fin/nb d'event) sur la période affichée. Clic gauche sur la carte affiche les coordonnées en MGRS
</commit_message>
<xml_diff>
--- a/TUTO_EventCartoViewer.pptx
+++ b/TUTO_EventCartoViewer.pptx
@@ -212,7 +212,7 @@
             <a:fld id="{BDF2A71B-5DC1-4CC3-81B5-30C08E317B94}" type="datetimeFigureOut">
               <a:rPr lang="fr-FR" smtClean="0"/>
               <a:pPr/>
-              <a:t>17/05/2022</a:t>
+              <a:t>12/08/2022</a:t>
             </a:fld>
             <a:endParaRPr lang="fr-FR"/>
           </a:p>
@@ -527,7 +527,7 @@
           </a:bodyPr>
           <a:lstStyle/>
           <a:p>
-            <a:endParaRPr lang="fr-FR"/>
+            <a:endParaRPr lang="fr-FR" dirty="0"/>
           </a:p>
         </p:txBody>
       </p:sp>
@@ -690,7 +690,7 @@
             <a:fld id="{2AD8A078-8F0D-4B44-934F-D3DB161891DE}" type="datetimeFigureOut">
               <a:rPr lang="fr-FR" smtClean="0"/>
               <a:pPr/>
-              <a:t>17/05/2022</a:t>
+              <a:t>12/08/2022</a:t>
             </a:fld>
             <a:endParaRPr lang="fr-FR"/>
           </a:p>
@@ -905,7 +905,7 @@
             <a:fld id="{2AD8A078-8F0D-4B44-934F-D3DB161891DE}" type="datetimeFigureOut">
               <a:rPr lang="fr-FR" smtClean="0"/>
               <a:pPr/>
-              <a:t>17/05/2022</a:t>
+              <a:t>12/08/2022</a:t>
             </a:fld>
             <a:endParaRPr lang="fr-FR"/>
           </a:p>
@@ -1375,7 +1375,7 @@
         <p:spPr>
           <a:xfrm>
             <a:off x="152400" y="1556792"/>
-            <a:ext cx="8839200" cy="400110"/>
+            <a:ext cx="8839200" cy="707886"/>
           </a:xfrm>
           <a:prstGeom prst="rect">
             <a:avLst/>
@@ -1389,22 +1389,13 @@
           <a:lstStyle/>
           <a:p>
             <a:r>
+              <a:rPr lang="fr-FR" sz="2000" dirty="0" err="1" smtClean="0"/>
+              <a:t>EventCartoViewer</a:t>
+            </a:r>
+            <a:r>
               <a:rPr lang="fr-FR" sz="2000" dirty="0" smtClean="0"/>
-              <a:t>Visualisation des événements sur </a:t>
-            </a:r>
-            <a:r>
-              <a:rPr lang="fr-FR" sz="2000" dirty="0" err="1" smtClean="0"/>
-              <a:t>carto</a:t>
-            </a:r>
-            <a:r>
-              <a:rPr lang="fr-FR" sz="2000" dirty="0" smtClean="0"/>
-              <a:t> avec </a:t>
-            </a:r>
-            <a:r>
-              <a:rPr lang="fr-FR" sz="2000" dirty="0" err="1" smtClean="0"/>
-              <a:t>timeline</a:t>
-            </a:r>
-            <a:endParaRPr lang="fr-FR" sz="2000" dirty="0" smtClean="0"/>
+              <a:t> permet de visualiser sur carte des évènements, avec la possibilité de déplacer un curseur sur une frise chronologique.</a:t>
+            </a:r>
           </a:p>
         </p:txBody>
       </p:sp>
@@ -1800,7 +1791,6 @@
               <a:rPr lang="fr-FR" dirty="0" smtClean="0"/>
               <a:t>GDH</a:t>
             </a:r>
-            <a:endParaRPr lang="fr-FR" dirty="0" smtClean="0"/>
           </a:p>
           <a:p>
             <a:endParaRPr lang="fr-FR" dirty="0" smtClean="0"/>
@@ -1895,14 +1885,50 @@
         </p:blipFill>
         <p:spPr>
           <a:xfrm>
-            <a:off x="0" y="877824"/>
-            <a:ext cx="9144000" cy="5980176"/>
+            <a:off x="401593" y="1301261"/>
+            <a:ext cx="8298893" cy="5427476"/>
           </a:xfrm>
           <a:prstGeom prst="rect">
             <a:avLst/>
           </a:prstGeom>
+          <a:ln>
+            <a:solidFill>
+              <a:schemeClr val="tx1"/>
+            </a:solidFill>
+          </a:ln>
         </p:spPr>
       </p:pic>
+      <p:sp>
+        <p:nvSpPr>
+          <p:cNvPr id="3" name="ZoneTexte 2"/>
+          <p:cNvSpPr txBox="1"/>
+          <p:nvPr/>
+        </p:nvSpPr>
+        <p:spPr>
+          <a:xfrm>
+            <a:off x="-20960" y="548680"/>
+            <a:ext cx="9144000" cy="584775"/>
+          </a:xfrm>
+          <a:prstGeom prst="rect">
+            <a:avLst/>
+          </a:prstGeom>
+          <a:noFill/>
+        </p:spPr>
+        <p:txBody>
+          <a:bodyPr wrap="square" rtlCol="0">
+            <a:spAutoFit/>
+          </a:bodyPr>
+          <a:lstStyle/>
+          <a:p>
+            <a:pPr algn="ctr"/>
+            <a:r>
+              <a:rPr lang="fr-FR" sz="3200" b="1" dirty="0" smtClean="0"/>
+              <a:t>Formats de fichiers</a:t>
+            </a:r>
+            <a:endParaRPr lang="fr-FR" sz="1600" b="1" dirty="0" smtClean="0"/>
+          </a:p>
+        </p:txBody>
+      </p:sp>
     </p:spTree>
     <p:extLst>
       <p:ext uri="{BB962C8B-B14F-4D97-AF65-F5344CB8AC3E}">

</xml_diff>